<commit_message>
Añadida la clase del 15 de noviembre
</commit_message>
<xml_diff>
--- a/Documentos/1 - Javascript.pptx
+++ b/Documentos/1 - Javascript.pptx
@@ -330,7 +330,7 @@
           <a:p>
             <a:fld id="{1160EA64-D806-43AC-9DF2-F8C432F32B4C}" type="datetimeFigureOut">
               <a:rPr lang="en-US" dirty="0"/>
-              <a:t>10/11/2025</a:t>
+              <a:t>11/15/2025</a:t>
             </a:fld>
             <a:endParaRPr lang="en-US" dirty="0"/>
           </a:p>
@@ -496,7 +496,7 @@
           <a:p>
             <a:fld id="{E9F9C37B-1D36-470B-8223-D6C91242EC14}" type="datetimeFigureOut">
               <a:rPr lang="en-US" dirty="0"/>
-              <a:t>10/11/2025</a:t>
+              <a:t>11/15/2025</a:t>
             </a:fld>
             <a:endParaRPr lang="en-US" dirty="0"/>
           </a:p>
@@ -671,7 +671,7 @@
           <a:p>
             <a:fld id="{67C6F52A-A82B-47A2-A83A-8C4C91F2D59F}" type="datetimeFigureOut">
               <a:rPr lang="en-US" dirty="0"/>
-              <a:t>10/11/2025</a:t>
+              <a:t>11/15/2025</a:t>
             </a:fld>
             <a:endParaRPr lang="en-US" dirty="0"/>
           </a:p>
@@ -836,7 +836,7 @@
           <a:p>
             <a:fld id="{F070A7B3-6521-4DCA-87E5-044747A908C1}" type="datetimeFigureOut">
               <a:rPr lang="en-US" dirty="0"/>
-              <a:t>10/11/2025</a:t>
+              <a:t>11/15/2025</a:t>
             </a:fld>
             <a:endParaRPr lang="en-US" dirty="0"/>
           </a:p>
@@ -1100,7 +1100,7 @@
           <a:p>
             <a:fld id="{1160EA64-D806-43AC-9DF2-F8C432F32B4C}" type="datetimeFigureOut">
               <a:rPr lang="en-US" dirty="0"/>
-              <a:t>10/11/2025</a:t>
+              <a:t>11/15/2025</a:t>
             </a:fld>
             <a:endParaRPr lang="en-US" dirty="0"/>
           </a:p>
@@ -1328,7 +1328,7 @@
           <a:p>
             <a:fld id="{AB134690-1557-4C89-A502-4959FE7FAD70}" type="datetimeFigureOut">
               <a:rPr lang="en-US" dirty="0"/>
-              <a:t>10/11/2025</a:t>
+              <a:t>11/15/2025</a:t>
             </a:fld>
             <a:endParaRPr lang="en-US" dirty="0"/>
           </a:p>
@@ -1682,7 +1682,7 @@
           <a:p>
             <a:fld id="{4F7D4976-E339-4826-83B7-FBD03F55ECF8}" type="datetimeFigureOut">
               <a:rPr lang="en-US" dirty="0"/>
-              <a:t>10/11/2025</a:t>
+              <a:t>11/15/2025</a:t>
             </a:fld>
             <a:endParaRPr lang="en-US" dirty="0"/>
           </a:p>
@@ -1818,7 +1818,7 @@
           <a:p>
             <a:fld id="{E1037C31-9E7A-4F99-8774-A0E530DE1A42}" type="datetimeFigureOut">
               <a:rPr lang="en-US" dirty="0"/>
-              <a:t>10/11/2025</a:t>
+              <a:t>11/15/2025</a:t>
             </a:fld>
             <a:endParaRPr lang="en-US" dirty="0"/>
           </a:p>
@@ -1908,7 +1908,7 @@
           <a:p>
             <a:fld id="{C278504F-A551-4DE0-9316-4DCD1D8CC752}" type="datetimeFigureOut">
               <a:rPr lang="en-US" dirty="0"/>
-              <a:t>10/11/2025</a:t>
+              <a:t>11/15/2025</a:t>
             </a:fld>
             <a:endParaRPr lang="en-US" dirty="0"/>
           </a:p>
@@ -2018,6 +2018,13 @@
             <a:schemeClr val="lt1"/>
           </a:fontRef>
         </p:style>
+        <p:txBody>
+          <a:bodyPr/>
+          <a:lstStyle/>
+          <a:p>
+            <a:endParaRPr lang="es-AR"/>
+          </a:p>
+        </p:txBody>
       </p:sp>
       <p:sp>
         <p:nvSpPr>
@@ -2260,7 +2267,7 @@
           <a:p>
             <a:fld id="{D1BE4249-C0D0-4B06-8692-E8BB871AF643}" type="datetimeFigureOut">
               <a:rPr lang="en-US" dirty="0"/>
-              <a:t>10/11/2025</a:t>
+              <a:t>11/15/2025</a:t>
             </a:fld>
             <a:endParaRPr lang="en-US" dirty="0"/>
           </a:p>
@@ -2612,7 +2619,7 @@
           <a:p>
             <a:fld id="{042B0DB6-F5C7-45FB-8CF3-31B45F9C2DAC}" type="datetimeFigureOut">
               <a:rPr lang="en-US" dirty="0"/>
-              <a:t>10/11/2025</a:t>
+              <a:t>11/15/2025</a:t>
             </a:fld>
             <a:endParaRPr lang="en-US" dirty="0"/>
           </a:p>
@@ -2849,7 +2856,7 @@
           <a:p>
             <a:fld id="{1160EA64-D806-43AC-9DF2-F8C432F32B4C}" type="datetimeFigureOut">
               <a:rPr lang="en-US" dirty="0"/>
-              <a:t>10/11/2025</a:t>
+              <a:t>11/15/2025</a:t>
             </a:fld>
             <a:endParaRPr lang="en-US" dirty="0"/>
           </a:p>
@@ -3336,7 +3343,7 @@
           <a:p>
             <a:r>
               <a:rPr lang="es-ES" dirty="0"/>
-              <a:t>REPASO JAVASCRIPT BÁSICO</a:t>
+              <a:t>REPASO JAVASCRIPT</a:t>
             </a:r>
             <a:endParaRPr lang="es-AR" dirty="0"/>
           </a:p>
@@ -6408,9 +6415,6 @@
             </a:r>
           </a:p>
           <a:p>
-            <a:endParaRPr lang="es-ES" dirty="0"/>
-          </a:p>
-          <a:p>
             <a:r>
               <a:rPr lang="es-ES" dirty="0"/>
               <a:t>Si </a:t>
@@ -6425,11 +6429,11 @@
                   </a:outerShdw>
                 </a:effectLst>
               </a:rPr>
-              <a:t>sólo</a:t>
-            </a:r>
-            <a:r>
-              <a:rPr lang="es-ES" dirty="0"/>
-              <a:t> se devuelve un valor, no es necesario poner llaves ni return</a:t>
+              <a:t>lo único que hace la función es un return</a:t>
+            </a:r>
+            <a:r>
+              <a:rPr lang="es-ES" dirty="0"/>
+              <a:t>, se pueden borrar las llaves y la palabra return</a:t>
             </a:r>
           </a:p>
           <a:p>
@@ -14930,6 +14934,12 @@
 </file>
 
 <file path=customXml/item1.xml><?xml version="1.0" encoding="utf-8"?>
+<p:properties xmlns:p="http://schemas.microsoft.com/office/2006/metadata/properties" xmlns:xsi="http://www.w3.org/2001/XMLSchema-instance" xmlns:pc="http://schemas.microsoft.com/office/infopath/2007/PartnerControls">
+  <documentManagement/>
+</p:properties>
+</file>
+
+<file path=customXml/item2.xml><?xml version="1.0" encoding="utf-8"?>
 <ct:contentTypeSchema xmlns:ct="http://schemas.microsoft.com/office/2006/metadata/contentType" xmlns:ma="http://schemas.microsoft.com/office/2006/metadata/properties/metaAttributes" ct:_="" ma:_="" ma:contentTypeName="Document" ma:contentTypeID="0x010100C8733208C828A0409B88C3F13BDC33A0" ma:contentTypeVersion="4" ma:contentTypeDescription="Create a new document." ma:contentTypeScope="" ma:versionID="d213e370b244847269b00bb75cf1b1d8">
   <xsd:schema xmlns:xsd="http://www.w3.org/2001/XMLSchema" xmlns:xs="http://www.w3.org/2001/XMLSchema" xmlns:p="http://schemas.microsoft.com/office/2006/metadata/properties" xmlns:ns3="0c3b2162-9bab-4fc9-97d6-f987dde52638" targetNamespace="http://schemas.microsoft.com/office/2006/metadata/properties" ma:root="true" ma:fieldsID="eede56b52e2659b18c5af9f8230c8e9c" ns3:_="">
     <xsd:import namespace="0c3b2162-9bab-4fc9-97d6-f987dde52638"/>
@@ -15073,7 +15083,7 @@
 </ct:contentTypeSchema>
 </file>
 
-<file path=customXml/item2.xml><?xml version="1.0" encoding="utf-8"?>
+<file path=customXml/item3.xml><?xml version="1.0" encoding="utf-8"?>
 <?mso-contentType ?>
 <FormTemplates xmlns="http://schemas.microsoft.com/sharepoint/v3/contenttype/forms">
   <Display>DocumentLibraryForm</Display>
@@ -15082,13 +15092,23 @@
 </FormTemplates>
 </file>
 
-<file path=customXml/item3.xml><?xml version="1.0" encoding="utf-8"?>
-<p:properties xmlns:p="http://schemas.microsoft.com/office/2006/metadata/properties" xmlns:xsi="http://www.w3.org/2001/XMLSchema-instance" xmlns:pc="http://schemas.microsoft.com/office/infopath/2007/PartnerControls">
-  <documentManagement/>
-</p:properties>
+<file path=customXml/itemProps1.xml><?xml version="1.0" encoding="utf-8"?>
+<ds:datastoreItem xmlns:ds="http://schemas.openxmlformats.org/officeDocument/2006/customXml" ds:itemID="{954AC2CD-81D3-4AEF-8940-FA44E667BF6D}">
+  <ds:schemaRefs>
+    <ds:schemaRef ds:uri="http://schemas.openxmlformats.org/package/2006/metadata/core-properties"/>
+    <ds:schemaRef ds:uri="http://purl.org/dc/dcmitype/"/>
+    <ds:schemaRef ds:uri="http://purl.org/dc/elements/1.1/"/>
+    <ds:schemaRef ds:uri="0c3b2162-9bab-4fc9-97d6-f987dde52638"/>
+    <ds:schemaRef ds:uri="http://www.w3.org/XML/1998/namespace"/>
+    <ds:schemaRef ds:uri="http://schemas.microsoft.com/office/2006/documentManagement/types"/>
+    <ds:schemaRef ds:uri="http://purl.org/dc/terms/"/>
+    <ds:schemaRef ds:uri="http://schemas.microsoft.com/office/infopath/2007/PartnerControls"/>
+    <ds:schemaRef ds:uri="http://schemas.microsoft.com/office/2006/metadata/properties"/>
+  </ds:schemaRefs>
+</ds:datastoreItem>
 </file>
 
-<file path=customXml/itemProps1.xml><?xml version="1.0" encoding="utf-8"?>
+<file path=customXml/itemProps2.xml><?xml version="1.0" encoding="utf-8"?>
 <ds:datastoreItem xmlns:ds="http://schemas.openxmlformats.org/officeDocument/2006/customXml" ds:itemID="{65E1B2EE-074E-478C-A6A1-B98EBE85149B}">
   <ds:schemaRefs>
     <ds:schemaRef ds:uri="http://schemas.microsoft.com/office/2006/metadata/contentType"/>
@@ -15106,26 +15126,10 @@
 </ds:datastoreItem>
 </file>
 
-<file path=customXml/itemProps2.xml><?xml version="1.0" encoding="utf-8"?>
+<file path=customXml/itemProps3.xml><?xml version="1.0" encoding="utf-8"?>
 <ds:datastoreItem xmlns:ds="http://schemas.openxmlformats.org/officeDocument/2006/customXml" ds:itemID="{F3C0D452-F1AD-4383-B79A-1FE4A30597E5}">
   <ds:schemaRefs>
     <ds:schemaRef ds:uri="http://schemas.microsoft.com/sharepoint/v3/contenttype/forms"/>
-  </ds:schemaRefs>
-</ds:datastoreItem>
-</file>
-
-<file path=customXml/itemProps3.xml><?xml version="1.0" encoding="utf-8"?>
-<ds:datastoreItem xmlns:ds="http://schemas.openxmlformats.org/officeDocument/2006/customXml" ds:itemID="{954AC2CD-81D3-4AEF-8940-FA44E667BF6D}">
-  <ds:schemaRefs>
-    <ds:schemaRef ds:uri="http://schemas.openxmlformats.org/package/2006/metadata/core-properties"/>
-    <ds:schemaRef ds:uri="http://purl.org/dc/dcmitype/"/>
-    <ds:schemaRef ds:uri="http://purl.org/dc/elements/1.1/"/>
-    <ds:schemaRef ds:uri="0c3b2162-9bab-4fc9-97d6-f987dde52638"/>
-    <ds:schemaRef ds:uri="http://www.w3.org/XML/1998/namespace"/>
-    <ds:schemaRef ds:uri="http://schemas.microsoft.com/office/2006/documentManagement/types"/>
-    <ds:schemaRef ds:uri="http://purl.org/dc/terms/"/>
-    <ds:schemaRef ds:uri="http://schemas.microsoft.com/office/infopath/2007/PartnerControls"/>
-    <ds:schemaRef ds:uri="http://schemas.microsoft.com/office/2006/metadata/properties"/>
   </ds:schemaRefs>
 </ds:datastoreItem>
 </file>

</xml_diff>

<commit_message>
Añadida la primer mitad de la clase del 16 de noviembre
</commit_message>
<xml_diff>
--- a/Documentos/1 - Javascript.pptx
+++ b/Documentos/1 - Javascript.pptx
@@ -50,9 +50,11 @@
     <p:sldId id="279" r:id="rId47"/>
     <p:sldId id="280" r:id="rId48"/>
     <p:sldId id="277" r:id="rId49"/>
-    <p:sldId id="278" r:id="rId50"/>
-    <p:sldId id="281" r:id="rId51"/>
-    <p:sldId id="282" r:id="rId52"/>
+    <p:sldId id="312" r:id="rId50"/>
+    <p:sldId id="311" r:id="rId51"/>
+    <p:sldId id="278" r:id="rId52"/>
+    <p:sldId id="281" r:id="rId53"/>
+    <p:sldId id="282" r:id="rId54"/>
   </p:sldIdLst>
   <p:sldSz cx="12192000" cy="6858000"/>
   <p:notesSz cx="6858000" cy="9144000"/>
@@ -330,7 +332,7 @@
           <a:p>
             <a:fld id="{1160EA64-D806-43AC-9DF2-F8C432F32B4C}" type="datetimeFigureOut">
               <a:rPr lang="en-US" dirty="0"/>
-              <a:t>11/15/2025</a:t>
+              <a:t>11/16/2025</a:t>
             </a:fld>
             <a:endParaRPr lang="en-US" dirty="0"/>
           </a:p>
@@ -496,7 +498,7 @@
           <a:p>
             <a:fld id="{E9F9C37B-1D36-470B-8223-D6C91242EC14}" type="datetimeFigureOut">
               <a:rPr lang="en-US" dirty="0"/>
-              <a:t>11/15/2025</a:t>
+              <a:t>11/16/2025</a:t>
             </a:fld>
             <a:endParaRPr lang="en-US" dirty="0"/>
           </a:p>
@@ -671,7 +673,7 @@
           <a:p>
             <a:fld id="{67C6F52A-A82B-47A2-A83A-8C4C91F2D59F}" type="datetimeFigureOut">
               <a:rPr lang="en-US" dirty="0"/>
-              <a:t>11/15/2025</a:t>
+              <a:t>11/16/2025</a:t>
             </a:fld>
             <a:endParaRPr lang="en-US" dirty="0"/>
           </a:p>
@@ -836,7 +838,7 @@
           <a:p>
             <a:fld id="{F070A7B3-6521-4DCA-87E5-044747A908C1}" type="datetimeFigureOut">
               <a:rPr lang="en-US" dirty="0"/>
-              <a:t>11/15/2025</a:t>
+              <a:t>11/16/2025</a:t>
             </a:fld>
             <a:endParaRPr lang="en-US" dirty="0"/>
           </a:p>
@@ -1100,7 +1102,7 @@
           <a:p>
             <a:fld id="{1160EA64-D806-43AC-9DF2-F8C432F32B4C}" type="datetimeFigureOut">
               <a:rPr lang="en-US" dirty="0"/>
-              <a:t>11/15/2025</a:t>
+              <a:t>11/16/2025</a:t>
             </a:fld>
             <a:endParaRPr lang="en-US" dirty="0"/>
           </a:p>
@@ -1328,7 +1330,7 @@
           <a:p>
             <a:fld id="{AB134690-1557-4C89-A502-4959FE7FAD70}" type="datetimeFigureOut">
               <a:rPr lang="en-US" dirty="0"/>
-              <a:t>11/15/2025</a:t>
+              <a:t>11/16/2025</a:t>
             </a:fld>
             <a:endParaRPr lang="en-US" dirty="0"/>
           </a:p>
@@ -1682,7 +1684,7 @@
           <a:p>
             <a:fld id="{4F7D4976-E339-4826-83B7-FBD03F55ECF8}" type="datetimeFigureOut">
               <a:rPr lang="en-US" dirty="0"/>
-              <a:t>11/15/2025</a:t>
+              <a:t>11/16/2025</a:t>
             </a:fld>
             <a:endParaRPr lang="en-US" dirty="0"/>
           </a:p>
@@ -1818,7 +1820,7 @@
           <a:p>
             <a:fld id="{E1037C31-9E7A-4F99-8774-A0E530DE1A42}" type="datetimeFigureOut">
               <a:rPr lang="en-US" dirty="0"/>
-              <a:t>11/15/2025</a:t>
+              <a:t>11/16/2025</a:t>
             </a:fld>
             <a:endParaRPr lang="en-US" dirty="0"/>
           </a:p>
@@ -1908,7 +1910,7 @@
           <a:p>
             <a:fld id="{C278504F-A551-4DE0-9316-4DCD1D8CC752}" type="datetimeFigureOut">
               <a:rPr lang="en-US" dirty="0"/>
-              <a:t>11/15/2025</a:t>
+              <a:t>11/16/2025</a:t>
             </a:fld>
             <a:endParaRPr lang="en-US" dirty="0"/>
           </a:p>
@@ -2267,7 +2269,7 @@
           <a:p>
             <a:fld id="{D1BE4249-C0D0-4B06-8692-E8BB871AF643}" type="datetimeFigureOut">
               <a:rPr lang="en-US" dirty="0"/>
-              <a:t>11/15/2025</a:t>
+              <a:t>11/16/2025</a:t>
             </a:fld>
             <a:endParaRPr lang="en-US" dirty="0"/>
           </a:p>
@@ -2619,7 +2621,7 @@
           <a:p>
             <a:fld id="{042B0DB6-F5C7-45FB-8CF3-31B45F9C2DAC}" type="datetimeFigureOut">
               <a:rPr lang="en-US" dirty="0"/>
-              <a:t>11/15/2025</a:t>
+              <a:t>11/16/2025</a:t>
             </a:fld>
             <a:endParaRPr lang="en-US" dirty="0"/>
           </a:p>
@@ -2856,7 +2858,7 @@
           <a:p>
             <a:fld id="{1160EA64-D806-43AC-9DF2-F8C432F32B4C}" type="datetimeFigureOut">
               <a:rPr lang="en-US" dirty="0"/>
-              <a:t>11/15/2025</a:t>
+              <a:t>11/16/2025</a:t>
             </a:fld>
             <a:endParaRPr lang="en-US" dirty="0"/>
           </a:p>
@@ -12156,6 +12158,288 @@
   <p:cSld>
     <p:spTree>
       <p:nvGrpSpPr>
+        <p:cNvPr id="1" name="">
+          <a:extLst>
+            <a:ext uri="{FF2B5EF4-FFF2-40B4-BE49-F238E27FC236}">
+              <a16:creationId xmlns:a16="http://schemas.microsoft.com/office/drawing/2014/main" id="{28424EF9-2FA8-3968-EC1D-01F0C93A8014}"/>
+            </a:ext>
+          </a:extLst>
+        </p:cNvPr>
+        <p:cNvGrpSpPr/>
+        <p:nvPr/>
+      </p:nvGrpSpPr>
+      <p:grpSpPr>
+        <a:xfrm>
+          <a:off x="0" y="0"/>
+          <a:ext cx="0" cy="0"/>
+          <a:chOff x="0" y="0"/>
+          <a:chExt cx="0" cy="0"/>
+        </a:xfrm>
+      </p:grpSpPr>
+      <p:sp>
+        <p:nvSpPr>
+          <p:cNvPr id="2" name="Título 1">
+            <a:extLst>
+              <a:ext uri="{FF2B5EF4-FFF2-40B4-BE49-F238E27FC236}">
+                <a16:creationId xmlns:a16="http://schemas.microsoft.com/office/drawing/2014/main" id="{C66CBD9B-72C5-F29C-28B9-4C0AE412CFB1}"/>
+              </a:ext>
+            </a:extLst>
+          </p:cNvPr>
+          <p:cNvSpPr>
+            <a:spLocks noGrp="1"/>
+          </p:cNvSpPr>
+          <p:nvPr>
+            <p:ph type="title"/>
+          </p:nvPr>
+        </p:nvSpPr>
+        <p:spPr/>
+        <p:txBody>
+          <a:bodyPr/>
+          <a:lstStyle/>
+          <a:p>
+            <a:r>
+              <a:rPr lang="es-ES" dirty="0" err="1"/>
+              <a:t>Array.map</a:t>
+            </a:r>
+            <a:r>
+              <a:rPr lang="es-ES" dirty="0"/>
+              <a:t>()</a:t>
+            </a:r>
+            <a:endParaRPr lang="es-AR" dirty="0"/>
+          </a:p>
+        </p:txBody>
+      </p:sp>
+      <p:pic>
+        <p:nvPicPr>
+          <p:cNvPr id="9" name="Imagen 8">
+            <a:extLst>
+              <a:ext uri="{FF2B5EF4-FFF2-40B4-BE49-F238E27FC236}">
+                <a16:creationId xmlns:a16="http://schemas.microsoft.com/office/drawing/2014/main" id="{8FAA3063-ACFF-DBE6-30C9-796427D13500}"/>
+              </a:ext>
+            </a:extLst>
+          </p:cNvPr>
+          <p:cNvPicPr>
+            <a:picLocks noChangeAspect="1"/>
+          </p:cNvPicPr>
+          <p:nvPr/>
+        </p:nvPicPr>
+        <p:blipFill>
+          <a:blip r:embed="rId2"/>
+          <a:stretch>
+            <a:fillRect/>
+          </a:stretch>
+        </p:blipFill>
+        <p:spPr>
+          <a:xfrm>
+            <a:off x="723795" y="3112839"/>
+            <a:ext cx="10744409" cy="2257659"/>
+          </a:xfrm>
+          <a:prstGeom prst="rect">
+            <a:avLst/>
+          </a:prstGeom>
+          <a:ln>
+            <a:noFill/>
+          </a:ln>
+          <a:effectLst>
+            <a:outerShdw blurRad="292100" dist="139700" dir="2700000" algn="tl" rotWithShape="0">
+              <a:srgbClr val="333333">
+                <a:alpha val="65000"/>
+              </a:srgbClr>
+            </a:outerShdw>
+          </a:effectLst>
+        </p:spPr>
+      </p:pic>
+    </p:spTree>
+    <p:extLst>
+      <p:ext uri="{BB962C8B-B14F-4D97-AF65-F5344CB8AC3E}">
+        <p14:creationId xmlns:p14="http://schemas.microsoft.com/office/powerpoint/2010/main" val="4246033390"/>
+      </p:ext>
+    </p:extLst>
+  </p:cSld>
+  <p:clrMapOvr>
+    <a:masterClrMapping/>
+  </p:clrMapOvr>
+  <mc:AlternateContent xmlns:mc="http://schemas.openxmlformats.org/markup-compatibility/2006" xmlns:p14="http://schemas.microsoft.com/office/powerpoint/2010/main">
+    <mc:Choice Requires="p14">
+      <p:transition spd="med" p14:dur="700">
+        <p:fade/>
+      </p:transition>
+    </mc:Choice>
+    <mc:Fallback xmlns="">
+      <p:transition spd="med">
+        <p:fade/>
+      </p:transition>
+    </mc:Fallback>
+  </mc:AlternateContent>
+</p:sld>
+</file>
+
+<file path=ppt/slides/slide47.xml><?xml version="1.0" encoding="utf-8"?>
+<p:sld xmlns:a="http://schemas.openxmlformats.org/drawingml/2006/main" xmlns:r="http://schemas.openxmlformats.org/officeDocument/2006/relationships" xmlns:p="http://schemas.openxmlformats.org/presentationml/2006/main">
+  <p:cSld>
+    <p:spTree>
+      <p:nvGrpSpPr>
+        <p:cNvPr id="1" name="">
+          <a:extLst>
+            <a:ext uri="{FF2B5EF4-FFF2-40B4-BE49-F238E27FC236}">
+              <a16:creationId xmlns:a16="http://schemas.microsoft.com/office/drawing/2014/main" id="{CDEB43B1-B4BE-72C7-6D11-594DED6B717B}"/>
+            </a:ext>
+          </a:extLst>
+        </p:cNvPr>
+        <p:cNvGrpSpPr/>
+        <p:nvPr/>
+      </p:nvGrpSpPr>
+      <p:grpSpPr>
+        <a:xfrm>
+          <a:off x="0" y="0"/>
+          <a:ext cx="0" cy="0"/>
+          <a:chOff x="0" y="0"/>
+          <a:chExt cx="0" cy="0"/>
+        </a:xfrm>
+      </p:grpSpPr>
+      <p:sp>
+        <p:nvSpPr>
+          <p:cNvPr id="2" name="Título 1">
+            <a:extLst>
+              <a:ext uri="{FF2B5EF4-FFF2-40B4-BE49-F238E27FC236}">
+                <a16:creationId xmlns:a16="http://schemas.microsoft.com/office/drawing/2014/main" id="{1E10528C-3CE1-B085-16C0-B513AE64C287}"/>
+              </a:ext>
+            </a:extLst>
+          </p:cNvPr>
+          <p:cNvSpPr>
+            <a:spLocks noGrp="1"/>
+          </p:cNvSpPr>
+          <p:nvPr>
+            <p:ph type="title"/>
+          </p:nvPr>
+        </p:nvSpPr>
+        <p:spPr/>
+        <p:txBody>
+          <a:bodyPr/>
+          <a:lstStyle/>
+          <a:p>
+            <a:r>
+              <a:rPr lang="es-ES" dirty="0" err="1"/>
+              <a:t>Array.map</a:t>
+            </a:r>
+            <a:r>
+              <a:rPr lang="es-ES" dirty="0"/>
+              <a:t>()</a:t>
+            </a:r>
+            <a:endParaRPr lang="es-AR" dirty="0"/>
+          </a:p>
+        </p:txBody>
+      </p:sp>
+      <p:pic>
+        <p:nvPicPr>
+          <p:cNvPr id="11" name="Imagen 10">
+            <a:extLst>
+              <a:ext uri="{FF2B5EF4-FFF2-40B4-BE49-F238E27FC236}">
+                <a16:creationId xmlns:a16="http://schemas.microsoft.com/office/drawing/2014/main" id="{9DB82463-7C42-D76C-E313-8A2D32E534DD}"/>
+              </a:ext>
+            </a:extLst>
+          </p:cNvPr>
+          <p:cNvPicPr>
+            <a:picLocks noChangeAspect="1"/>
+          </p:cNvPicPr>
+          <p:nvPr/>
+        </p:nvPicPr>
+        <p:blipFill>
+          <a:blip r:embed="rId2"/>
+          <a:stretch>
+            <a:fillRect/>
+          </a:stretch>
+        </p:blipFill>
+        <p:spPr>
+          <a:xfrm>
+            <a:off x="2231136" y="2488527"/>
+            <a:ext cx="7729728" cy="1880946"/>
+          </a:xfrm>
+          <a:prstGeom prst="rect">
+            <a:avLst/>
+          </a:prstGeom>
+          <a:ln>
+            <a:noFill/>
+          </a:ln>
+          <a:effectLst>
+            <a:outerShdw blurRad="292100" dist="139700" dir="2700000" algn="tl" rotWithShape="0">
+              <a:srgbClr val="333333">
+                <a:alpha val="65000"/>
+              </a:srgbClr>
+            </a:outerShdw>
+          </a:effectLst>
+        </p:spPr>
+      </p:pic>
+      <p:pic>
+        <p:nvPicPr>
+          <p:cNvPr id="13" name="Imagen 12">
+            <a:extLst>
+              <a:ext uri="{FF2B5EF4-FFF2-40B4-BE49-F238E27FC236}">
+                <a16:creationId xmlns:a16="http://schemas.microsoft.com/office/drawing/2014/main" id="{5DC384F9-A3A7-4587-E8FD-F7DE77D489B3}"/>
+              </a:ext>
+            </a:extLst>
+          </p:cNvPr>
+          <p:cNvPicPr>
+            <a:picLocks noChangeAspect="1"/>
+          </p:cNvPicPr>
+          <p:nvPr/>
+        </p:nvPicPr>
+        <p:blipFill>
+          <a:blip r:embed="rId3"/>
+          <a:stretch>
+            <a:fillRect/>
+          </a:stretch>
+        </p:blipFill>
+        <p:spPr>
+          <a:xfrm>
+            <a:off x="1845547" y="4704588"/>
+            <a:ext cx="8500906" cy="1289206"/>
+          </a:xfrm>
+          <a:prstGeom prst="rect">
+            <a:avLst/>
+          </a:prstGeom>
+          <a:ln>
+            <a:noFill/>
+          </a:ln>
+          <a:effectLst>
+            <a:outerShdw blurRad="292100" dist="139700" dir="2700000" algn="tl" rotWithShape="0">
+              <a:srgbClr val="333333">
+                <a:alpha val="65000"/>
+              </a:srgbClr>
+            </a:outerShdw>
+          </a:effectLst>
+        </p:spPr>
+      </p:pic>
+    </p:spTree>
+    <p:extLst>
+      <p:ext uri="{BB962C8B-B14F-4D97-AF65-F5344CB8AC3E}">
+        <p14:creationId xmlns:p14="http://schemas.microsoft.com/office/powerpoint/2010/main" val="2170626162"/>
+      </p:ext>
+    </p:extLst>
+  </p:cSld>
+  <p:clrMapOvr>
+    <a:masterClrMapping/>
+  </p:clrMapOvr>
+  <mc:AlternateContent xmlns:mc="http://schemas.openxmlformats.org/markup-compatibility/2006" xmlns:p14="http://schemas.microsoft.com/office/powerpoint/2010/main">
+    <mc:Choice Requires="p14">
+      <p:transition spd="med" p14:dur="700">
+        <p:fade/>
+      </p:transition>
+    </mc:Choice>
+    <mc:Fallback xmlns="">
+      <p:transition spd="med">
+        <p:fade/>
+      </p:transition>
+    </mc:Fallback>
+  </mc:AlternateContent>
+</p:sld>
+</file>
+
+<file path=ppt/slides/slide48.xml><?xml version="1.0" encoding="utf-8"?>
+<p:sld xmlns:a="http://schemas.openxmlformats.org/drawingml/2006/main" xmlns:r="http://schemas.openxmlformats.org/officeDocument/2006/relationships" xmlns:p="http://schemas.openxmlformats.org/presentationml/2006/main">
+  <p:cSld>
+    <p:spTree>
+      <p:nvGrpSpPr>
         <p:cNvPr id="1" name=""/>
         <p:cNvGrpSpPr/>
         <p:nvPr/>
@@ -12310,7 +12594,7 @@
 </p:sld>
 </file>
 
-<file path=ppt/slides/slide47.xml><?xml version="1.0" encoding="utf-8"?>
+<file path=ppt/slides/slide49.xml><?xml version="1.0" encoding="utf-8"?>
 <p:sld xmlns:a="http://schemas.openxmlformats.org/drawingml/2006/main" xmlns:r="http://schemas.openxmlformats.org/officeDocument/2006/relationships" xmlns:p="http://schemas.openxmlformats.org/presentationml/2006/main">
   <p:cSld>
     <p:bg>
@@ -12672,378 +12956,6 @@
     <p:extLst>
       <p:ext uri="{BB962C8B-B14F-4D97-AF65-F5344CB8AC3E}">
         <p14:creationId xmlns:p14="http://schemas.microsoft.com/office/powerpoint/2010/main" val="2233033096"/>
-      </p:ext>
-    </p:extLst>
-  </p:cSld>
-  <p:clrMapOvr>
-    <a:masterClrMapping/>
-  </p:clrMapOvr>
-  <mc:AlternateContent xmlns:mc="http://schemas.openxmlformats.org/markup-compatibility/2006" xmlns:p14="http://schemas.microsoft.com/office/powerpoint/2010/main">
-    <mc:Choice Requires="p14">
-      <p:transition spd="med" p14:dur="700">
-        <p:fade/>
-      </p:transition>
-    </mc:Choice>
-    <mc:Fallback xmlns="">
-      <p:transition spd="med">
-        <p:fade/>
-      </p:transition>
-    </mc:Fallback>
-  </mc:AlternateContent>
-</p:sld>
-</file>
-
-<file path=ppt/slides/slide48.xml><?xml version="1.0" encoding="utf-8"?>
-<p:sld xmlns:a="http://schemas.openxmlformats.org/drawingml/2006/main" xmlns:r="http://schemas.openxmlformats.org/officeDocument/2006/relationships" xmlns:p="http://schemas.openxmlformats.org/presentationml/2006/main">
-  <p:cSld>
-    <p:bg>
-      <p:bgPr>
-        <a:solidFill>
-          <a:schemeClr val="bg1"/>
-        </a:solidFill>
-        <a:effectLst/>
-      </p:bgPr>
-    </p:bg>
-    <p:spTree>
-      <p:nvGrpSpPr>
-        <p:cNvPr id="1" name=""/>
-        <p:cNvGrpSpPr/>
-        <p:nvPr/>
-      </p:nvGrpSpPr>
-      <p:grpSpPr>
-        <a:xfrm>
-          <a:off x="0" y="0"/>
-          <a:ext cx="0" cy="0"/>
-          <a:chOff x="0" y="0"/>
-          <a:chExt cx="0" cy="0"/>
-        </a:xfrm>
-      </p:grpSpPr>
-      <p:sp>
-        <p:nvSpPr>
-          <p:cNvPr id="8" name="Rectangle 7">
-            <a:extLst>
-              <a:ext uri="{FF2B5EF4-FFF2-40B4-BE49-F238E27FC236}">
-                <a16:creationId xmlns:a16="http://schemas.microsoft.com/office/drawing/2014/main" id="{C33976D1-3430-450C-A978-87A9A6E8E71F}"/>
-              </a:ext>
-              <a:ext uri="{C183D7F6-B498-43B3-948B-1728B52AA6E4}">
-                <adec:decorative xmlns:adec="http://schemas.microsoft.com/office/drawing/2017/decorative" val="1"/>
-              </a:ext>
-            </a:extLst>
-          </p:cNvPr>
-          <p:cNvSpPr>
-            <a:spLocks noGrp="1" noRot="1" noChangeAspect="1" noMove="1" noResize="1" noEditPoints="1" noAdjustHandles="1" noChangeArrowheads="1" noChangeShapeType="1" noTextEdit="1"/>
-          </p:cNvSpPr>
-          <p:nvPr>
-            <p:extLst>
-              <p:ext uri="{386F3935-93C4-4BCD-93E2-E3B085C9AB24}">
-                <p16:designElem xmlns:p16="http://schemas.microsoft.com/office/powerpoint/2015/main" val="1"/>
-              </p:ext>
-            </p:extLst>
-          </p:nvPr>
-        </p:nvSpPr>
-        <p:spPr>
-          <a:xfrm>
-            <a:off x="0" y="0"/>
-            <a:ext cx="12192000" cy="6858000"/>
-          </a:xfrm>
-          <a:prstGeom prst="rect">
-            <a:avLst/>
-          </a:prstGeom>
-          <a:solidFill>
-            <a:schemeClr val="accent2"/>
-          </a:solidFill>
-          <a:ln>
-            <a:noFill/>
-          </a:ln>
-        </p:spPr>
-        <p:style>
-          <a:lnRef idx="2">
-            <a:schemeClr val="accent1">
-              <a:shade val="50000"/>
-            </a:schemeClr>
-          </a:lnRef>
-          <a:fillRef idx="1">
-            <a:schemeClr val="accent1"/>
-          </a:fillRef>
-          <a:effectRef idx="0">
-            <a:schemeClr val="accent1"/>
-          </a:effectRef>
-          <a:fontRef idx="minor">
-            <a:schemeClr val="lt1"/>
-          </a:fontRef>
-        </p:style>
-        <p:txBody>
-          <a:bodyPr rtlCol="0" anchor="ctr"/>
-          <a:lstStyle/>
-          <a:p>
-            <a:pPr algn="ctr"/>
-            <a:endParaRPr lang="en-US"/>
-          </a:p>
-        </p:txBody>
-      </p:sp>
-      <p:sp>
-        <p:nvSpPr>
-          <p:cNvPr id="10" name="Rectangle 9">
-            <a:extLst>
-              <a:ext uri="{FF2B5EF4-FFF2-40B4-BE49-F238E27FC236}">
-                <a16:creationId xmlns:a16="http://schemas.microsoft.com/office/drawing/2014/main" id="{7D6AAC78-7D86-415A-ADC1-2B474807960C}"/>
-              </a:ext>
-              <a:ext uri="{C183D7F6-B498-43B3-948B-1728B52AA6E4}">
-                <adec:decorative xmlns:adec="http://schemas.microsoft.com/office/drawing/2017/decorative" val="1"/>
-              </a:ext>
-            </a:extLst>
-          </p:cNvPr>
-          <p:cNvSpPr>
-            <a:spLocks noGrp="1" noRot="1" noChangeAspect="1" noMove="1" noResize="1" noEditPoints="1" noAdjustHandles="1" noChangeArrowheads="1" noChangeShapeType="1" noTextEdit="1"/>
-          </p:cNvSpPr>
-          <p:nvPr>
-            <p:extLst>
-              <p:ext uri="{386F3935-93C4-4BCD-93E2-E3B085C9AB24}">
-                <p16:designElem xmlns:p16="http://schemas.microsoft.com/office/powerpoint/2015/main" val="1"/>
-              </p:ext>
-            </p:extLst>
-          </p:nvPr>
-        </p:nvSpPr>
-        <p:spPr>
-          <a:xfrm>
-            <a:off x="1249680" y="1248156"/>
-            <a:ext cx="9692640" cy="4361688"/>
-          </a:xfrm>
-          <a:prstGeom prst="rect">
-            <a:avLst/>
-          </a:prstGeom>
-          <a:solidFill>
-            <a:srgbClr val="FFFFFF"/>
-          </a:solidFill>
-          <a:ln>
-            <a:noFill/>
-          </a:ln>
-        </p:spPr>
-        <p:style>
-          <a:lnRef idx="2">
-            <a:schemeClr val="accent1">
-              <a:shade val="50000"/>
-            </a:schemeClr>
-          </a:lnRef>
-          <a:fillRef idx="1">
-            <a:schemeClr val="accent1"/>
-          </a:fillRef>
-          <a:effectRef idx="0">
-            <a:schemeClr val="accent1"/>
-          </a:effectRef>
-          <a:fontRef idx="minor">
-            <a:schemeClr val="lt1"/>
-          </a:fontRef>
-        </p:style>
-        <p:txBody>
-          <a:bodyPr rtlCol="0" anchor="ctr"/>
-          <a:lstStyle/>
-          <a:p>
-            <a:pPr algn="ctr"/>
-            <a:endParaRPr lang="en-US"/>
-          </a:p>
-        </p:txBody>
-      </p:sp>
-      <p:sp>
-        <p:nvSpPr>
-          <p:cNvPr id="12" name="Rectangle 11">
-            <a:extLst>
-              <a:ext uri="{FF2B5EF4-FFF2-40B4-BE49-F238E27FC236}">
-                <a16:creationId xmlns:a16="http://schemas.microsoft.com/office/drawing/2014/main" id="{F2A658D9-F185-44F1-BA33-D50320D1D078}"/>
-              </a:ext>
-              <a:ext uri="{C183D7F6-B498-43B3-948B-1728B52AA6E4}">
-                <adec:decorative xmlns:adec="http://schemas.microsoft.com/office/drawing/2017/decorative" val="1"/>
-              </a:ext>
-            </a:extLst>
-          </p:cNvPr>
-          <p:cNvSpPr>
-            <a:spLocks noGrp="1" noRot="1" noChangeAspect="1" noMove="1" noResize="1" noEditPoints="1" noAdjustHandles="1" noChangeArrowheads="1" noChangeShapeType="1" noTextEdit="1"/>
-          </p:cNvSpPr>
-          <p:nvPr>
-            <p:extLst>
-              <p:ext uri="{386F3935-93C4-4BCD-93E2-E3B085C9AB24}">
-                <p16:designElem xmlns:p16="http://schemas.microsoft.com/office/powerpoint/2015/main" val="1"/>
-              </p:ext>
-            </p:extLst>
-          </p:nvPr>
-        </p:nvSpPr>
-        <p:spPr>
-          <a:xfrm>
-            <a:off x="1062228" y="1060704"/>
-            <a:ext cx="10067544" cy="4736592"/>
-          </a:xfrm>
-          <a:prstGeom prst="rect">
-            <a:avLst/>
-          </a:prstGeom>
-          <a:noFill/>
-          <a:ln w="31750" cap="sq">
-            <a:solidFill>
-              <a:srgbClr val="FFFFFF"/>
-            </a:solidFill>
-            <a:miter lim="800000"/>
-          </a:ln>
-        </p:spPr>
-        <p:style>
-          <a:lnRef idx="2">
-            <a:schemeClr val="accent1">
-              <a:shade val="50000"/>
-            </a:schemeClr>
-          </a:lnRef>
-          <a:fillRef idx="1">
-            <a:schemeClr val="accent1"/>
-          </a:fillRef>
-          <a:effectRef idx="0">
-            <a:schemeClr val="accent1"/>
-          </a:effectRef>
-          <a:fontRef idx="minor">
-            <a:schemeClr val="lt1"/>
-          </a:fontRef>
-        </p:style>
-        <p:txBody>
-          <a:bodyPr rtlCol="0" anchor="ctr"/>
-          <a:lstStyle/>
-          <a:p>
-            <a:pPr algn="ctr"/>
-            <a:endParaRPr lang="en-US"/>
-          </a:p>
-        </p:txBody>
-      </p:sp>
-      <p:sp>
-        <p:nvSpPr>
-          <p:cNvPr id="2" name="Título 1">
-            <a:extLst>
-              <a:ext uri="{FF2B5EF4-FFF2-40B4-BE49-F238E27FC236}">
-                <a16:creationId xmlns:a16="http://schemas.microsoft.com/office/drawing/2014/main" id="{49EAECCC-5517-21F0-96FD-C5521513F8F3}"/>
-              </a:ext>
-            </a:extLst>
-          </p:cNvPr>
-          <p:cNvSpPr>
-            <a:spLocks noGrp="1"/>
-          </p:cNvSpPr>
-          <p:nvPr>
-            <p:ph type="title"/>
-          </p:nvPr>
-        </p:nvSpPr>
-        <p:spPr>
-          <a:xfrm>
-            <a:off x="2231136" y="467418"/>
-            <a:ext cx="7729728" cy="1188720"/>
-          </a:xfrm>
-          <a:solidFill>
-            <a:srgbClr val="FFFFFF"/>
-          </a:solidFill>
-        </p:spPr>
-        <p:txBody>
-          <a:bodyPr>
-            <a:normAutofit/>
-          </a:bodyPr>
-          <a:lstStyle/>
-          <a:p>
-            <a:r>
-              <a:rPr lang="es-ES" dirty="0"/>
-              <a:t>Links útiles para métodos de </a:t>
-            </a:r>
-            <a:r>
-              <a:rPr lang="es-ES" dirty="0" err="1"/>
-              <a:t>arrays</a:t>
-            </a:r>
-            <a:endParaRPr lang="es-AR" dirty="0"/>
-          </a:p>
-        </p:txBody>
-      </p:sp>
-      <p:sp>
-        <p:nvSpPr>
-          <p:cNvPr id="3" name="Marcador de contenido 2">
-            <a:extLst>
-              <a:ext uri="{FF2B5EF4-FFF2-40B4-BE49-F238E27FC236}">
-                <a16:creationId xmlns:a16="http://schemas.microsoft.com/office/drawing/2014/main" id="{2D457C10-A42E-1C18-959A-77C1E049240A}"/>
-              </a:ext>
-            </a:extLst>
-          </p:cNvPr>
-          <p:cNvSpPr>
-            <a:spLocks noGrp="1"/>
-          </p:cNvSpPr>
-          <p:nvPr>
-            <p:ph idx="1"/>
-          </p:nvPr>
-        </p:nvSpPr>
-        <p:spPr>
-          <a:xfrm>
-            <a:off x="1706062" y="2291262"/>
-            <a:ext cx="8779512" cy="2879256"/>
-          </a:xfrm>
-        </p:spPr>
-        <p:txBody>
-          <a:bodyPr>
-            <a:normAutofit/>
-          </a:bodyPr>
-          <a:lstStyle/>
-          <a:p>
-            <a:pPr marL="0" indent="0">
-              <a:buNone/>
-            </a:pPr>
-            <a:r>
-              <a:rPr lang="es-AR" b="0" dirty="0">
-                <a:solidFill>
-                  <a:srgbClr val="404040"/>
-                </a:solidFill>
-                <a:effectLst/>
-                <a:latin typeface="Consolas" panose="020B0609020204030204" pitchFamily="49" charset="0"/>
-                <a:hlinkClick r:id="rId2"/>
-              </a:rPr>
-              <a:t>https://www.w3schools.com/js/js_array_methods.asp</a:t>
-            </a:r>
-            <a:endParaRPr lang="es-AR" dirty="0">
-              <a:solidFill>
-                <a:srgbClr val="404040"/>
-              </a:solidFill>
-              <a:latin typeface="Consolas" panose="020B0609020204030204" pitchFamily="49" charset="0"/>
-            </a:endParaRPr>
-          </a:p>
-          <a:p>
-            <a:pPr marL="0" indent="0">
-              <a:buNone/>
-            </a:pPr>
-            <a:r>
-              <a:rPr lang="es-AR" b="0" dirty="0">
-                <a:solidFill>
-                  <a:srgbClr val="404040"/>
-                </a:solidFill>
-                <a:effectLst/>
-                <a:latin typeface="Consolas" panose="020B0609020204030204" pitchFamily="49" charset="0"/>
-              </a:rPr>
-              <a:t>https://www.w3schools.com/js/js_array_iteration.asp</a:t>
-            </a:r>
-            <a:br>
-              <a:rPr lang="es-AR" b="0" dirty="0">
-                <a:solidFill>
-                  <a:srgbClr val="404040"/>
-                </a:solidFill>
-                <a:effectLst/>
-                <a:latin typeface="Consolas" panose="020B0609020204030204" pitchFamily="49" charset="0"/>
-              </a:rPr>
-            </a:br>
-            <a:endParaRPr lang="es-AR" b="0" dirty="0">
-              <a:solidFill>
-                <a:srgbClr val="404040"/>
-              </a:solidFill>
-              <a:effectLst/>
-              <a:latin typeface="Consolas" panose="020B0609020204030204" pitchFamily="49" charset="0"/>
-            </a:endParaRPr>
-          </a:p>
-          <a:p>
-            <a:endParaRPr lang="es-AR" dirty="0">
-              <a:solidFill>
-                <a:srgbClr val="404040"/>
-              </a:solidFill>
-            </a:endParaRPr>
-          </a:p>
-        </p:txBody>
-      </p:sp>
-    </p:spTree>
-    <p:extLst>
-      <p:ext uri="{BB962C8B-B14F-4D97-AF65-F5344CB8AC3E}">
-        <p14:creationId xmlns:p14="http://schemas.microsoft.com/office/powerpoint/2010/main" val="616231504"/>
       </p:ext>
     </p:extLst>
   </p:cSld>
@@ -13346,6 +13258,378 @@
   </p:cSld>
   <p:clrMapOvr>
     <a:overrideClrMapping bg1="lt1" tx1="dk1" bg2="lt2" tx2="dk2" accent1="accent1" accent2="accent2" accent3="accent3" accent4="accent4" accent5="accent5" accent6="accent6" hlink="hlink" folHlink="folHlink"/>
+  </p:clrMapOvr>
+  <mc:AlternateContent xmlns:mc="http://schemas.openxmlformats.org/markup-compatibility/2006" xmlns:p14="http://schemas.microsoft.com/office/powerpoint/2010/main">
+    <mc:Choice Requires="p14">
+      <p:transition spd="med" p14:dur="700">
+        <p:fade/>
+      </p:transition>
+    </mc:Choice>
+    <mc:Fallback xmlns="">
+      <p:transition spd="med">
+        <p:fade/>
+      </p:transition>
+    </mc:Fallback>
+  </mc:AlternateContent>
+</p:sld>
+</file>
+
+<file path=ppt/slides/slide50.xml><?xml version="1.0" encoding="utf-8"?>
+<p:sld xmlns:a="http://schemas.openxmlformats.org/drawingml/2006/main" xmlns:r="http://schemas.openxmlformats.org/officeDocument/2006/relationships" xmlns:p="http://schemas.openxmlformats.org/presentationml/2006/main">
+  <p:cSld>
+    <p:bg>
+      <p:bgPr>
+        <a:solidFill>
+          <a:schemeClr val="bg1"/>
+        </a:solidFill>
+        <a:effectLst/>
+      </p:bgPr>
+    </p:bg>
+    <p:spTree>
+      <p:nvGrpSpPr>
+        <p:cNvPr id="1" name=""/>
+        <p:cNvGrpSpPr/>
+        <p:nvPr/>
+      </p:nvGrpSpPr>
+      <p:grpSpPr>
+        <a:xfrm>
+          <a:off x="0" y="0"/>
+          <a:ext cx="0" cy="0"/>
+          <a:chOff x="0" y="0"/>
+          <a:chExt cx="0" cy="0"/>
+        </a:xfrm>
+      </p:grpSpPr>
+      <p:sp>
+        <p:nvSpPr>
+          <p:cNvPr id="8" name="Rectangle 7">
+            <a:extLst>
+              <a:ext uri="{FF2B5EF4-FFF2-40B4-BE49-F238E27FC236}">
+                <a16:creationId xmlns:a16="http://schemas.microsoft.com/office/drawing/2014/main" id="{C33976D1-3430-450C-A978-87A9A6E8E71F}"/>
+              </a:ext>
+              <a:ext uri="{C183D7F6-B498-43B3-948B-1728B52AA6E4}">
+                <adec:decorative xmlns:adec="http://schemas.microsoft.com/office/drawing/2017/decorative" val="1"/>
+              </a:ext>
+            </a:extLst>
+          </p:cNvPr>
+          <p:cNvSpPr>
+            <a:spLocks noGrp="1" noRot="1" noChangeAspect="1" noMove="1" noResize="1" noEditPoints="1" noAdjustHandles="1" noChangeArrowheads="1" noChangeShapeType="1" noTextEdit="1"/>
+          </p:cNvSpPr>
+          <p:nvPr>
+            <p:extLst>
+              <p:ext uri="{386F3935-93C4-4BCD-93E2-E3B085C9AB24}">
+                <p16:designElem xmlns:p16="http://schemas.microsoft.com/office/powerpoint/2015/main" val="1"/>
+              </p:ext>
+            </p:extLst>
+          </p:nvPr>
+        </p:nvSpPr>
+        <p:spPr>
+          <a:xfrm>
+            <a:off x="0" y="0"/>
+            <a:ext cx="12192000" cy="6858000"/>
+          </a:xfrm>
+          <a:prstGeom prst="rect">
+            <a:avLst/>
+          </a:prstGeom>
+          <a:solidFill>
+            <a:schemeClr val="accent2"/>
+          </a:solidFill>
+          <a:ln>
+            <a:noFill/>
+          </a:ln>
+        </p:spPr>
+        <p:style>
+          <a:lnRef idx="2">
+            <a:schemeClr val="accent1">
+              <a:shade val="50000"/>
+            </a:schemeClr>
+          </a:lnRef>
+          <a:fillRef idx="1">
+            <a:schemeClr val="accent1"/>
+          </a:fillRef>
+          <a:effectRef idx="0">
+            <a:schemeClr val="accent1"/>
+          </a:effectRef>
+          <a:fontRef idx="minor">
+            <a:schemeClr val="lt1"/>
+          </a:fontRef>
+        </p:style>
+        <p:txBody>
+          <a:bodyPr rtlCol="0" anchor="ctr"/>
+          <a:lstStyle/>
+          <a:p>
+            <a:pPr algn="ctr"/>
+            <a:endParaRPr lang="en-US"/>
+          </a:p>
+        </p:txBody>
+      </p:sp>
+      <p:sp>
+        <p:nvSpPr>
+          <p:cNvPr id="10" name="Rectangle 9">
+            <a:extLst>
+              <a:ext uri="{FF2B5EF4-FFF2-40B4-BE49-F238E27FC236}">
+                <a16:creationId xmlns:a16="http://schemas.microsoft.com/office/drawing/2014/main" id="{7D6AAC78-7D86-415A-ADC1-2B474807960C}"/>
+              </a:ext>
+              <a:ext uri="{C183D7F6-B498-43B3-948B-1728B52AA6E4}">
+                <adec:decorative xmlns:adec="http://schemas.microsoft.com/office/drawing/2017/decorative" val="1"/>
+              </a:ext>
+            </a:extLst>
+          </p:cNvPr>
+          <p:cNvSpPr>
+            <a:spLocks noGrp="1" noRot="1" noChangeAspect="1" noMove="1" noResize="1" noEditPoints="1" noAdjustHandles="1" noChangeArrowheads="1" noChangeShapeType="1" noTextEdit="1"/>
+          </p:cNvSpPr>
+          <p:nvPr>
+            <p:extLst>
+              <p:ext uri="{386F3935-93C4-4BCD-93E2-E3B085C9AB24}">
+                <p16:designElem xmlns:p16="http://schemas.microsoft.com/office/powerpoint/2015/main" val="1"/>
+              </p:ext>
+            </p:extLst>
+          </p:nvPr>
+        </p:nvSpPr>
+        <p:spPr>
+          <a:xfrm>
+            <a:off x="1249680" y="1248156"/>
+            <a:ext cx="9692640" cy="4361688"/>
+          </a:xfrm>
+          <a:prstGeom prst="rect">
+            <a:avLst/>
+          </a:prstGeom>
+          <a:solidFill>
+            <a:srgbClr val="FFFFFF"/>
+          </a:solidFill>
+          <a:ln>
+            <a:noFill/>
+          </a:ln>
+        </p:spPr>
+        <p:style>
+          <a:lnRef idx="2">
+            <a:schemeClr val="accent1">
+              <a:shade val="50000"/>
+            </a:schemeClr>
+          </a:lnRef>
+          <a:fillRef idx="1">
+            <a:schemeClr val="accent1"/>
+          </a:fillRef>
+          <a:effectRef idx="0">
+            <a:schemeClr val="accent1"/>
+          </a:effectRef>
+          <a:fontRef idx="minor">
+            <a:schemeClr val="lt1"/>
+          </a:fontRef>
+        </p:style>
+        <p:txBody>
+          <a:bodyPr rtlCol="0" anchor="ctr"/>
+          <a:lstStyle/>
+          <a:p>
+            <a:pPr algn="ctr"/>
+            <a:endParaRPr lang="en-US"/>
+          </a:p>
+        </p:txBody>
+      </p:sp>
+      <p:sp>
+        <p:nvSpPr>
+          <p:cNvPr id="12" name="Rectangle 11">
+            <a:extLst>
+              <a:ext uri="{FF2B5EF4-FFF2-40B4-BE49-F238E27FC236}">
+                <a16:creationId xmlns:a16="http://schemas.microsoft.com/office/drawing/2014/main" id="{F2A658D9-F185-44F1-BA33-D50320D1D078}"/>
+              </a:ext>
+              <a:ext uri="{C183D7F6-B498-43B3-948B-1728B52AA6E4}">
+                <adec:decorative xmlns:adec="http://schemas.microsoft.com/office/drawing/2017/decorative" val="1"/>
+              </a:ext>
+            </a:extLst>
+          </p:cNvPr>
+          <p:cNvSpPr>
+            <a:spLocks noGrp="1" noRot="1" noChangeAspect="1" noMove="1" noResize="1" noEditPoints="1" noAdjustHandles="1" noChangeArrowheads="1" noChangeShapeType="1" noTextEdit="1"/>
+          </p:cNvSpPr>
+          <p:nvPr>
+            <p:extLst>
+              <p:ext uri="{386F3935-93C4-4BCD-93E2-E3B085C9AB24}">
+                <p16:designElem xmlns:p16="http://schemas.microsoft.com/office/powerpoint/2015/main" val="1"/>
+              </p:ext>
+            </p:extLst>
+          </p:nvPr>
+        </p:nvSpPr>
+        <p:spPr>
+          <a:xfrm>
+            <a:off x="1062228" y="1060704"/>
+            <a:ext cx="10067544" cy="4736592"/>
+          </a:xfrm>
+          <a:prstGeom prst="rect">
+            <a:avLst/>
+          </a:prstGeom>
+          <a:noFill/>
+          <a:ln w="31750" cap="sq">
+            <a:solidFill>
+              <a:srgbClr val="FFFFFF"/>
+            </a:solidFill>
+            <a:miter lim="800000"/>
+          </a:ln>
+        </p:spPr>
+        <p:style>
+          <a:lnRef idx="2">
+            <a:schemeClr val="accent1">
+              <a:shade val="50000"/>
+            </a:schemeClr>
+          </a:lnRef>
+          <a:fillRef idx="1">
+            <a:schemeClr val="accent1"/>
+          </a:fillRef>
+          <a:effectRef idx="0">
+            <a:schemeClr val="accent1"/>
+          </a:effectRef>
+          <a:fontRef idx="minor">
+            <a:schemeClr val="lt1"/>
+          </a:fontRef>
+        </p:style>
+        <p:txBody>
+          <a:bodyPr rtlCol="0" anchor="ctr"/>
+          <a:lstStyle/>
+          <a:p>
+            <a:pPr algn="ctr"/>
+            <a:endParaRPr lang="en-US"/>
+          </a:p>
+        </p:txBody>
+      </p:sp>
+      <p:sp>
+        <p:nvSpPr>
+          <p:cNvPr id="2" name="Título 1">
+            <a:extLst>
+              <a:ext uri="{FF2B5EF4-FFF2-40B4-BE49-F238E27FC236}">
+                <a16:creationId xmlns:a16="http://schemas.microsoft.com/office/drawing/2014/main" id="{49EAECCC-5517-21F0-96FD-C5521513F8F3}"/>
+              </a:ext>
+            </a:extLst>
+          </p:cNvPr>
+          <p:cNvSpPr>
+            <a:spLocks noGrp="1"/>
+          </p:cNvSpPr>
+          <p:nvPr>
+            <p:ph type="title"/>
+          </p:nvPr>
+        </p:nvSpPr>
+        <p:spPr>
+          <a:xfrm>
+            <a:off x="2231136" y="467418"/>
+            <a:ext cx="7729728" cy="1188720"/>
+          </a:xfrm>
+          <a:solidFill>
+            <a:srgbClr val="FFFFFF"/>
+          </a:solidFill>
+        </p:spPr>
+        <p:txBody>
+          <a:bodyPr>
+            <a:normAutofit/>
+          </a:bodyPr>
+          <a:lstStyle/>
+          <a:p>
+            <a:r>
+              <a:rPr lang="es-ES" dirty="0"/>
+              <a:t>Links útiles para métodos de </a:t>
+            </a:r>
+            <a:r>
+              <a:rPr lang="es-ES" dirty="0" err="1"/>
+              <a:t>arrays</a:t>
+            </a:r>
+            <a:endParaRPr lang="es-AR" dirty="0"/>
+          </a:p>
+        </p:txBody>
+      </p:sp>
+      <p:sp>
+        <p:nvSpPr>
+          <p:cNvPr id="3" name="Marcador de contenido 2">
+            <a:extLst>
+              <a:ext uri="{FF2B5EF4-FFF2-40B4-BE49-F238E27FC236}">
+                <a16:creationId xmlns:a16="http://schemas.microsoft.com/office/drawing/2014/main" id="{2D457C10-A42E-1C18-959A-77C1E049240A}"/>
+              </a:ext>
+            </a:extLst>
+          </p:cNvPr>
+          <p:cNvSpPr>
+            <a:spLocks noGrp="1"/>
+          </p:cNvSpPr>
+          <p:nvPr>
+            <p:ph idx="1"/>
+          </p:nvPr>
+        </p:nvSpPr>
+        <p:spPr>
+          <a:xfrm>
+            <a:off x="1706062" y="2291262"/>
+            <a:ext cx="8779512" cy="2879256"/>
+          </a:xfrm>
+        </p:spPr>
+        <p:txBody>
+          <a:bodyPr>
+            <a:normAutofit/>
+          </a:bodyPr>
+          <a:lstStyle/>
+          <a:p>
+            <a:pPr marL="0" indent="0">
+              <a:buNone/>
+            </a:pPr>
+            <a:r>
+              <a:rPr lang="es-AR" b="0" dirty="0">
+                <a:solidFill>
+                  <a:srgbClr val="404040"/>
+                </a:solidFill>
+                <a:effectLst/>
+                <a:latin typeface="Consolas" panose="020B0609020204030204" pitchFamily="49" charset="0"/>
+                <a:hlinkClick r:id="rId2"/>
+              </a:rPr>
+              <a:t>https://www.w3schools.com/js/js_array_methods.asp</a:t>
+            </a:r>
+            <a:endParaRPr lang="es-AR" dirty="0">
+              <a:solidFill>
+                <a:srgbClr val="404040"/>
+              </a:solidFill>
+              <a:latin typeface="Consolas" panose="020B0609020204030204" pitchFamily="49" charset="0"/>
+            </a:endParaRPr>
+          </a:p>
+          <a:p>
+            <a:pPr marL="0" indent="0">
+              <a:buNone/>
+            </a:pPr>
+            <a:r>
+              <a:rPr lang="es-AR" b="0" dirty="0">
+                <a:solidFill>
+                  <a:srgbClr val="404040"/>
+                </a:solidFill>
+                <a:effectLst/>
+                <a:latin typeface="Consolas" panose="020B0609020204030204" pitchFamily="49" charset="0"/>
+              </a:rPr>
+              <a:t>https://www.w3schools.com/js/js_array_iteration.asp</a:t>
+            </a:r>
+            <a:br>
+              <a:rPr lang="es-AR" b="0" dirty="0">
+                <a:solidFill>
+                  <a:srgbClr val="404040"/>
+                </a:solidFill>
+                <a:effectLst/>
+                <a:latin typeface="Consolas" panose="020B0609020204030204" pitchFamily="49" charset="0"/>
+              </a:rPr>
+            </a:br>
+            <a:endParaRPr lang="es-AR" b="0" dirty="0">
+              <a:solidFill>
+                <a:srgbClr val="404040"/>
+              </a:solidFill>
+              <a:effectLst/>
+              <a:latin typeface="Consolas" panose="020B0609020204030204" pitchFamily="49" charset="0"/>
+            </a:endParaRPr>
+          </a:p>
+          <a:p>
+            <a:endParaRPr lang="es-AR" dirty="0">
+              <a:solidFill>
+                <a:srgbClr val="404040"/>
+              </a:solidFill>
+            </a:endParaRPr>
+          </a:p>
+        </p:txBody>
+      </p:sp>
+    </p:spTree>
+    <p:extLst>
+      <p:ext uri="{BB962C8B-B14F-4D97-AF65-F5344CB8AC3E}">
+        <p14:creationId xmlns:p14="http://schemas.microsoft.com/office/powerpoint/2010/main" val="616231504"/>
+      </p:ext>
+    </p:extLst>
+  </p:cSld>
+  <p:clrMapOvr>
+    <a:masterClrMapping/>
   </p:clrMapOvr>
   <mc:AlternateContent xmlns:mc="http://schemas.openxmlformats.org/markup-compatibility/2006" xmlns:p14="http://schemas.microsoft.com/office/powerpoint/2010/main">
     <mc:Choice Requires="p14">
@@ -14934,12 +15218,21 @@
 </file>
 
 <file path=customXml/item1.xml><?xml version="1.0" encoding="utf-8"?>
+<?mso-contentType ?>
+<FormTemplates xmlns="http://schemas.microsoft.com/sharepoint/v3/contenttype/forms">
+  <Display>DocumentLibraryForm</Display>
+  <Edit>DocumentLibraryForm</Edit>
+  <New>DocumentLibraryForm</New>
+</FormTemplates>
+</file>
+
+<file path=customXml/item2.xml><?xml version="1.0" encoding="utf-8"?>
 <p:properties xmlns:p="http://schemas.microsoft.com/office/2006/metadata/properties" xmlns:xsi="http://www.w3.org/2001/XMLSchema-instance" xmlns:pc="http://schemas.microsoft.com/office/infopath/2007/PartnerControls">
   <documentManagement/>
 </p:properties>
 </file>
 
-<file path=customXml/item2.xml><?xml version="1.0" encoding="utf-8"?>
+<file path=customXml/item3.xml><?xml version="1.0" encoding="utf-8"?>
 <ct:contentTypeSchema xmlns:ct="http://schemas.microsoft.com/office/2006/metadata/contentType" xmlns:ma="http://schemas.microsoft.com/office/2006/metadata/properties/metaAttributes" ct:_="" ma:_="" ma:contentTypeName="Document" ma:contentTypeID="0x010100C8733208C828A0409B88C3F13BDC33A0" ma:contentTypeVersion="4" ma:contentTypeDescription="Create a new document." ma:contentTypeScope="" ma:versionID="d213e370b244847269b00bb75cf1b1d8">
   <xsd:schema xmlns:xsd="http://www.w3.org/2001/XMLSchema" xmlns:xs="http://www.w3.org/2001/XMLSchema" xmlns:p="http://schemas.microsoft.com/office/2006/metadata/properties" xmlns:ns3="0c3b2162-9bab-4fc9-97d6-f987dde52638" targetNamespace="http://schemas.microsoft.com/office/2006/metadata/properties" ma:root="true" ma:fieldsID="eede56b52e2659b18c5af9f8230c8e9c" ns3:_="">
     <xsd:import namespace="0c3b2162-9bab-4fc9-97d6-f987dde52638"/>
@@ -15083,16 +15376,15 @@
 </ct:contentTypeSchema>
 </file>
 
-<file path=customXml/item3.xml><?xml version="1.0" encoding="utf-8"?>
-<?mso-contentType ?>
-<FormTemplates xmlns="http://schemas.microsoft.com/sharepoint/v3/contenttype/forms">
-  <Display>DocumentLibraryForm</Display>
-  <Edit>DocumentLibraryForm</Edit>
-  <New>DocumentLibraryForm</New>
-</FormTemplates>
+<file path=customXml/itemProps1.xml><?xml version="1.0" encoding="utf-8"?>
+<ds:datastoreItem xmlns:ds="http://schemas.openxmlformats.org/officeDocument/2006/customXml" ds:itemID="{F3C0D452-F1AD-4383-B79A-1FE4A30597E5}">
+  <ds:schemaRefs>
+    <ds:schemaRef ds:uri="http://schemas.microsoft.com/sharepoint/v3/contenttype/forms"/>
+  </ds:schemaRefs>
+</ds:datastoreItem>
 </file>
 
-<file path=customXml/itemProps1.xml><?xml version="1.0" encoding="utf-8"?>
+<file path=customXml/itemProps2.xml><?xml version="1.0" encoding="utf-8"?>
 <ds:datastoreItem xmlns:ds="http://schemas.openxmlformats.org/officeDocument/2006/customXml" ds:itemID="{954AC2CD-81D3-4AEF-8940-FA44E667BF6D}">
   <ds:schemaRefs>
     <ds:schemaRef ds:uri="http://schemas.openxmlformats.org/package/2006/metadata/core-properties"/>
@@ -15108,7 +15400,7 @@
 </ds:datastoreItem>
 </file>
 
-<file path=customXml/itemProps2.xml><?xml version="1.0" encoding="utf-8"?>
+<file path=customXml/itemProps3.xml><?xml version="1.0" encoding="utf-8"?>
 <ds:datastoreItem xmlns:ds="http://schemas.openxmlformats.org/officeDocument/2006/customXml" ds:itemID="{65E1B2EE-074E-478C-A6A1-B98EBE85149B}">
   <ds:schemaRefs>
     <ds:schemaRef ds:uri="http://schemas.microsoft.com/office/2006/metadata/contentType"/>
@@ -15126,14 +15418,6 @@
 </ds:datastoreItem>
 </file>
 
-<file path=customXml/itemProps3.xml><?xml version="1.0" encoding="utf-8"?>
-<ds:datastoreItem xmlns:ds="http://schemas.openxmlformats.org/officeDocument/2006/customXml" ds:itemID="{F3C0D452-F1AD-4383-B79A-1FE4A30597E5}">
-  <ds:schemaRefs>
-    <ds:schemaRef ds:uri="http://schemas.microsoft.com/sharepoint/v3/contenttype/forms"/>
-  </ds:schemaRefs>
-</ds:datastoreItem>
-</file>
-
 <file path=docMetadata/LabelInfo.xml><?xml version="1.0" encoding="utf-8"?>
 <clbl:labelList xmlns:clbl="http://schemas.microsoft.com/office/2020/mipLabelMetadata">
   <clbl:label id="{a6fe1b1e-97b7-422d-b1bc-e37254398663}" enabled="0" method="" siteId="{a6fe1b1e-97b7-422d-b1bc-e37254398663}" removed="1"/>

</xml_diff>